<commit_message>
Add function definition slide
</commit_message>
<xml_diff>
--- a/Functions/Go Functions.pptx
+++ b/Functions/Go Functions.pptx
@@ -6,6 +6,7 @@
   </p:sldMasterIdLst>
   <p:sldIdLst>
     <p:sldId id="256" r:id="rId2"/>
+    <p:sldId id="257" r:id="rId3"/>
   </p:sldIdLst>
   <p:sldSz cx="12192000" cy="6858000"/>
   <p:notesSz cx="6858000" cy="9144000"/>
@@ -3407,16 +3408,760 @@
           <a:lstStyle/>
           <a:p>
             <a:r>
-              <a:rPr lang="en-US"/>
+              <a:rPr lang="en-US" dirty="0"/>
               <a:t>Kevin Lin</a:t>
             </a:r>
           </a:p>
         </p:txBody>
       </p:sp>
+      <p:pic>
+        <p:nvPicPr>
+          <p:cNvPr id="5" name="Picture 4">
+            <a:extLst>
+              <a:ext uri="{FF2B5EF4-FFF2-40B4-BE49-F238E27FC236}">
+                <a16:creationId xmlns:a16="http://schemas.microsoft.com/office/drawing/2014/main" id="{A4D85482-20EF-4BFE-9391-2770FEB67F69}"/>
+              </a:ext>
+            </a:extLst>
+          </p:cNvPr>
+          <p:cNvPicPr>
+            <a:picLocks noChangeAspect="1"/>
+          </p:cNvPicPr>
+          <p:nvPr/>
+        </p:nvPicPr>
+        <p:blipFill>
+          <a:blip r:embed="rId2"/>
+          <a:stretch>
+            <a:fillRect/>
+          </a:stretch>
+        </p:blipFill>
+        <p:spPr>
+          <a:xfrm>
+            <a:off x="6288974" y="1783080"/>
+            <a:ext cx="2286000" cy="2286000"/>
+          </a:xfrm>
+          <a:prstGeom prst="rect">
+            <a:avLst/>
+          </a:prstGeom>
+        </p:spPr>
+      </p:pic>
     </p:spTree>
     <p:extLst>
       <p:ext uri="{BB962C8B-B14F-4D97-AF65-F5344CB8AC3E}">
         <p14:creationId xmlns:p14="http://schemas.microsoft.com/office/powerpoint/2010/main" val="2824055210"/>
+      </p:ext>
+    </p:extLst>
+  </p:cSld>
+  <p:clrMapOvr>
+    <a:masterClrMapping/>
+  </p:clrMapOvr>
+</p:sld>
+</file>
+
+<file path=ppt/slides/slide2.xml><?xml version="1.0" encoding="utf-8"?>
+<p:sld xmlns:a="http://schemas.openxmlformats.org/drawingml/2006/main" xmlns:r="http://schemas.openxmlformats.org/officeDocument/2006/relationships" xmlns:p="http://schemas.openxmlformats.org/presentationml/2006/main">
+  <p:cSld>
+    <p:spTree>
+      <p:nvGrpSpPr>
+        <p:cNvPr id="1" name=""/>
+        <p:cNvGrpSpPr/>
+        <p:nvPr/>
+      </p:nvGrpSpPr>
+      <p:grpSpPr>
+        <a:xfrm>
+          <a:off x="0" y="0"/>
+          <a:ext cx="0" cy="0"/>
+          <a:chOff x="0" y="0"/>
+          <a:chExt cx="0" cy="0"/>
+        </a:xfrm>
+      </p:grpSpPr>
+      <p:sp>
+        <p:nvSpPr>
+          <p:cNvPr id="11" name="Rectangle 10">
+            <a:extLst>
+              <a:ext uri="{FF2B5EF4-FFF2-40B4-BE49-F238E27FC236}">
+                <a16:creationId xmlns:a16="http://schemas.microsoft.com/office/drawing/2014/main" id="{153808F8-8130-4AF0-A8DA-A9519B71170E}"/>
+              </a:ext>
+            </a:extLst>
+          </p:cNvPr>
+          <p:cNvSpPr/>
+          <p:nvPr/>
+        </p:nvSpPr>
+        <p:spPr>
+          <a:xfrm>
+            <a:off x="9078686" y="2624447"/>
+            <a:ext cx="1757548" cy="486888"/>
+          </a:xfrm>
+          <a:prstGeom prst="rect">
+            <a:avLst/>
+          </a:prstGeom>
+        </p:spPr>
+        <p:style>
+          <a:lnRef idx="1">
+            <a:schemeClr val="dk1"/>
+          </a:lnRef>
+          <a:fillRef idx="2">
+            <a:schemeClr val="dk1"/>
+          </a:fillRef>
+          <a:effectRef idx="1">
+            <a:schemeClr val="dk1"/>
+          </a:effectRef>
+          <a:fontRef idx="minor">
+            <a:schemeClr val="dk1"/>
+          </a:fontRef>
+        </p:style>
+        <p:txBody>
+          <a:bodyPr rtlCol="0" anchor="ctr"/>
+          <a:lstStyle/>
+          <a:p>
+            <a:pPr algn="ctr"/>
+            <a:endParaRPr lang="en-US"/>
+          </a:p>
+        </p:txBody>
+      </p:sp>
+      <p:sp>
+        <p:nvSpPr>
+          <p:cNvPr id="10" name="Rectangle 9">
+            <a:extLst>
+              <a:ext uri="{FF2B5EF4-FFF2-40B4-BE49-F238E27FC236}">
+                <a16:creationId xmlns:a16="http://schemas.microsoft.com/office/drawing/2014/main" id="{33AA33DF-2EEA-411E-84A9-D0A73711EBC2}"/>
+              </a:ext>
+            </a:extLst>
+          </p:cNvPr>
+          <p:cNvSpPr/>
+          <p:nvPr/>
+        </p:nvSpPr>
+        <p:spPr>
+          <a:xfrm>
+            <a:off x="7083631" y="2624447"/>
+            <a:ext cx="1995055" cy="486888"/>
+          </a:xfrm>
+          <a:prstGeom prst="rect">
+            <a:avLst/>
+          </a:prstGeom>
+        </p:spPr>
+        <p:style>
+          <a:lnRef idx="1">
+            <a:schemeClr val="accent2"/>
+          </a:lnRef>
+          <a:fillRef idx="2">
+            <a:schemeClr val="accent2"/>
+          </a:fillRef>
+          <a:effectRef idx="1">
+            <a:schemeClr val="accent2"/>
+          </a:effectRef>
+          <a:fontRef idx="minor">
+            <a:schemeClr val="dk1"/>
+          </a:fontRef>
+        </p:style>
+        <p:txBody>
+          <a:bodyPr rtlCol="0" anchor="ctr"/>
+          <a:lstStyle/>
+          <a:p>
+            <a:pPr algn="ctr"/>
+            <a:endParaRPr lang="en-US"/>
+          </a:p>
+        </p:txBody>
+      </p:sp>
+      <p:sp>
+        <p:nvSpPr>
+          <p:cNvPr id="9" name="Rectangle 8">
+            <a:extLst>
+              <a:ext uri="{FF2B5EF4-FFF2-40B4-BE49-F238E27FC236}">
+                <a16:creationId xmlns:a16="http://schemas.microsoft.com/office/drawing/2014/main" id="{BB9EAD48-0B11-4D72-9468-1BAB3AC2AD83}"/>
+              </a:ext>
+            </a:extLst>
+          </p:cNvPr>
+          <p:cNvSpPr/>
+          <p:nvPr/>
+        </p:nvSpPr>
+        <p:spPr>
+          <a:xfrm>
+            <a:off x="4845132" y="2624447"/>
+            <a:ext cx="2238499" cy="486888"/>
+          </a:xfrm>
+          <a:prstGeom prst="rect">
+            <a:avLst/>
+          </a:prstGeom>
+        </p:spPr>
+        <p:style>
+          <a:lnRef idx="1">
+            <a:schemeClr val="accent3"/>
+          </a:lnRef>
+          <a:fillRef idx="2">
+            <a:schemeClr val="accent3"/>
+          </a:fillRef>
+          <a:effectRef idx="1">
+            <a:schemeClr val="accent3"/>
+          </a:effectRef>
+          <a:fontRef idx="minor">
+            <a:schemeClr val="dk1"/>
+          </a:fontRef>
+        </p:style>
+        <p:txBody>
+          <a:bodyPr rtlCol="0" anchor="ctr"/>
+          <a:lstStyle/>
+          <a:p>
+            <a:pPr algn="ctr"/>
+            <a:endParaRPr lang="en-US"/>
+          </a:p>
+        </p:txBody>
+      </p:sp>
+      <p:sp>
+        <p:nvSpPr>
+          <p:cNvPr id="8" name="Rectangle 7">
+            <a:extLst>
+              <a:ext uri="{FF2B5EF4-FFF2-40B4-BE49-F238E27FC236}">
+                <a16:creationId xmlns:a16="http://schemas.microsoft.com/office/drawing/2014/main" id="{3E0AE543-8F8D-4B85-8DCB-CB3E288D9301}"/>
+              </a:ext>
+            </a:extLst>
+          </p:cNvPr>
+          <p:cNvSpPr/>
+          <p:nvPr/>
+        </p:nvSpPr>
+        <p:spPr>
+          <a:xfrm>
+            <a:off x="4102925" y="2624447"/>
+            <a:ext cx="742207" cy="486888"/>
+          </a:xfrm>
+          <a:prstGeom prst="rect">
+            <a:avLst/>
+          </a:prstGeom>
+        </p:spPr>
+        <p:style>
+          <a:lnRef idx="1">
+            <a:schemeClr val="accent1"/>
+          </a:lnRef>
+          <a:fillRef idx="2">
+            <a:schemeClr val="accent1"/>
+          </a:fillRef>
+          <a:effectRef idx="1">
+            <a:schemeClr val="accent1"/>
+          </a:effectRef>
+          <a:fontRef idx="minor">
+            <a:schemeClr val="dk1"/>
+          </a:fontRef>
+        </p:style>
+        <p:txBody>
+          <a:bodyPr rtlCol="0" anchor="ctr"/>
+          <a:lstStyle/>
+          <a:p>
+            <a:pPr algn="ctr"/>
+            <a:endParaRPr lang="en-US"/>
+          </a:p>
+        </p:txBody>
+      </p:sp>
+      <p:sp>
+        <p:nvSpPr>
+          <p:cNvPr id="2" name="Title 1">
+            <a:extLst>
+              <a:ext uri="{FF2B5EF4-FFF2-40B4-BE49-F238E27FC236}">
+                <a16:creationId xmlns:a16="http://schemas.microsoft.com/office/drawing/2014/main" id="{BA18D1DC-5275-4C58-B7D9-BA663D120B77}"/>
+              </a:ext>
+            </a:extLst>
+          </p:cNvPr>
+          <p:cNvSpPr>
+            <a:spLocks noGrp="1"/>
+          </p:cNvSpPr>
+          <p:nvPr>
+            <p:ph type="title"/>
+          </p:nvPr>
+        </p:nvSpPr>
+        <p:spPr/>
+        <p:txBody>
+          <a:bodyPr/>
+          <a:lstStyle/>
+          <a:p>
+            <a:r>
+              <a:rPr lang="en-US" dirty="0"/>
+              <a:t>Function definition</a:t>
+            </a:r>
+          </a:p>
+        </p:txBody>
+      </p:sp>
+      <p:sp>
+        <p:nvSpPr>
+          <p:cNvPr id="7" name="Content Placeholder 6">
+            <a:extLst>
+              <a:ext uri="{FF2B5EF4-FFF2-40B4-BE49-F238E27FC236}">
+                <a16:creationId xmlns:a16="http://schemas.microsoft.com/office/drawing/2014/main" id="{4E8D1F2C-CDD4-4F71-ABCB-1D4D312552B9}"/>
+              </a:ext>
+            </a:extLst>
+          </p:cNvPr>
+          <p:cNvSpPr>
+            <a:spLocks noGrp="1"/>
+          </p:cNvSpPr>
+          <p:nvPr>
+            <p:ph idx="1"/>
+          </p:nvPr>
+        </p:nvSpPr>
+        <p:spPr/>
+        <p:txBody>
+          <a:bodyPr>
+            <a:normAutofit/>
+          </a:bodyPr>
+          <a:lstStyle/>
+          <a:p>
+            <a:r>
+              <a:rPr lang="en-US" sz="2800" b="1" dirty="0">
+                <a:solidFill>
+                  <a:schemeClr val="tx1"/>
+                </a:solidFill>
+              </a:rPr>
+              <a:t>func functionName(parameters) returnType{</a:t>
+            </a:r>
+          </a:p>
+          <a:p>
+            <a:pPr marL="0" indent="0">
+              <a:buNone/>
+            </a:pPr>
+            <a:endParaRPr lang="en-US" sz="2800" b="1" dirty="0">
+              <a:solidFill>
+                <a:schemeClr val="tx1"/>
+              </a:solidFill>
+            </a:endParaRPr>
+          </a:p>
+          <a:p>
+            <a:pPr marL="0" indent="0">
+              <a:buNone/>
+            </a:pPr>
+            <a:r>
+              <a:rPr lang="en-US" sz="2800" b="1" dirty="0">
+                <a:solidFill>
+                  <a:schemeClr val="tx1"/>
+                </a:solidFill>
+              </a:rPr>
+              <a:t>}</a:t>
+            </a:r>
+          </a:p>
+        </p:txBody>
+      </p:sp>
+      <p:sp>
+        <p:nvSpPr>
+          <p:cNvPr id="12" name="Rectangle 11">
+            <a:extLst>
+              <a:ext uri="{FF2B5EF4-FFF2-40B4-BE49-F238E27FC236}">
+                <a16:creationId xmlns:a16="http://schemas.microsoft.com/office/drawing/2014/main" id="{D03478A4-BC24-4387-8C6C-977AE4FA5847}"/>
+              </a:ext>
+            </a:extLst>
+          </p:cNvPr>
+          <p:cNvSpPr/>
+          <p:nvPr/>
+        </p:nvSpPr>
+        <p:spPr>
+          <a:xfrm>
+            <a:off x="4281055" y="3111335"/>
+            <a:ext cx="6555179" cy="682831"/>
+          </a:xfrm>
+          <a:prstGeom prst="rect">
+            <a:avLst/>
+          </a:prstGeom>
+        </p:spPr>
+        <p:style>
+          <a:lnRef idx="1">
+            <a:schemeClr val="accent6"/>
+          </a:lnRef>
+          <a:fillRef idx="2">
+            <a:schemeClr val="accent6"/>
+          </a:fillRef>
+          <a:effectRef idx="1">
+            <a:schemeClr val="accent6"/>
+          </a:effectRef>
+          <a:fontRef idx="minor">
+            <a:schemeClr val="dk1"/>
+          </a:fontRef>
+        </p:style>
+        <p:txBody>
+          <a:bodyPr rtlCol="0" anchor="ctr"/>
+          <a:lstStyle/>
+          <a:p>
+            <a:pPr algn="ctr"/>
+            <a:endParaRPr lang="en-US" sz="2400" b="1" dirty="0"/>
+          </a:p>
+        </p:txBody>
+      </p:sp>
+      <p:cxnSp>
+        <p:nvCxnSpPr>
+          <p:cNvPr id="16" name="Straight Arrow Connector 15">
+            <a:extLst>
+              <a:ext uri="{FF2B5EF4-FFF2-40B4-BE49-F238E27FC236}">
+                <a16:creationId xmlns:a16="http://schemas.microsoft.com/office/drawing/2014/main" id="{BE1F64B2-6B01-4D4A-ABCC-2060E41B72A6}"/>
+              </a:ext>
+            </a:extLst>
+          </p:cNvPr>
+          <p:cNvCxnSpPr/>
+          <p:nvPr/>
+        </p:nvCxnSpPr>
+        <p:spPr>
+          <a:xfrm flipV="1">
+            <a:off x="7018317" y="3859481"/>
+            <a:ext cx="0" cy="486888"/>
+          </a:xfrm>
+          <a:prstGeom prst="straightConnector1">
+            <a:avLst/>
+          </a:prstGeom>
+          <a:ln>
+            <a:tailEnd type="triangle"/>
+          </a:ln>
+        </p:spPr>
+        <p:style>
+          <a:lnRef idx="1">
+            <a:schemeClr val="accent6"/>
+          </a:lnRef>
+          <a:fillRef idx="0">
+            <a:schemeClr val="accent6"/>
+          </a:fillRef>
+          <a:effectRef idx="0">
+            <a:schemeClr val="accent6"/>
+          </a:effectRef>
+          <a:fontRef idx="minor">
+            <a:schemeClr val="tx1"/>
+          </a:fontRef>
+        </p:style>
+      </p:cxnSp>
+      <p:cxnSp>
+        <p:nvCxnSpPr>
+          <p:cNvPr id="20" name="Connector: Elbow 19">
+            <a:extLst>
+              <a:ext uri="{FF2B5EF4-FFF2-40B4-BE49-F238E27FC236}">
+                <a16:creationId xmlns:a16="http://schemas.microsoft.com/office/drawing/2014/main" id="{67DA9D09-3C64-4EEA-AE4A-75F745915794}"/>
+              </a:ext>
+            </a:extLst>
+          </p:cNvPr>
+          <p:cNvCxnSpPr>
+            <a:cxnSpLocks/>
+            <a:endCxn id="8" idx="0"/>
+          </p:cNvCxnSpPr>
+          <p:nvPr/>
+        </p:nvCxnSpPr>
+        <p:spPr>
+          <a:xfrm rot="5400000">
+            <a:off x="4243945" y="2201388"/>
+            <a:ext cx="653144" cy="192975"/>
+          </a:xfrm>
+          <a:prstGeom prst="bentConnector3">
+            <a:avLst/>
+          </a:prstGeom>
+          <a:ln>
+            <a:tailEnd type="triangle"/>
+          </a:ln>
+        </p:spPr>
+        <p:style>
+          <a:lnRef idx="1">
+            <a:schemeClr val="accent1"/>
+          </a:lnRef>
+          <a:fillRef idx="0">
+            <a:schemeClr val="accent1"/>
+          </a:fillRef>
+          <a:effectRef idx="0">
+            <a:schemeClr val="accent1"/>
+          </a:effectRef>
+          <a:fontRef idx="minor">
+            <a:schemeClr val="tx1"/>
+          </a:fontRef>
+        </p:style>
+      </p:cxnSp>
+      <p:cxnSp>
+        <p:nvCxnSpPr>
+          <p:cNvPr id="22" name="Connector: Elbow 21">
+            <a:extLst>
+              <a:ext uri="{FF2B5EF4-FFF2-40B4-BE49-F238E27FC236}">
+                <a16:creationId xmlns:a16="http://schemas.microsoft.com/office/drawing/2014/main" id="{41256B03-9D19-402F-A9D4-62E2A0CAEE82}"/>
+              </a:ext>
+            </a:extLst>
+          </p:cNvPr>
+          <p:cNvCxnSpPr>
+            <a:endCxn id="9" idx="0"/>
+          </p:cNvCxnSpPr>
+          <p:nvPr/>
+        </p:nvCxnSpPr>
+        <p:spPr>
+          <a:xfrm rot="5400000">
+            <a:off x="5670962" y="2199409"/>
+            <a:ext cx="718458" cy="131618"/>
+          </a:xfrm>
+          <a:prstGeom prst="bentConnector3">
+            <a:avLst/>
+          </a:prstGeom>
+          <a:ln>
+            <a:tailEnd type="triangle"/>
+          </a:ln>
+        </p:spPr>
+        <p:style>
+          <a:lnRef idx="1">
+            <a:schemeClr val="accent3"/>
+          </a:lnRef>
+          <a:fillRef idx="0">
+            <a:schemeClr val="accent3"/>
+          </a:fillRef>
+          <a:effectRef idx="0">
+            <a:schemeClr val="accent3"/>
+          </a:effectRef>
+          <a:fontRef idx="minor">
+            <a:schemeClr val="tx1"/>
+          </a:fontRef>
+        </p:style>
+      </p:cxnSp>
+      <p:cxnSp>
+        <p:nvCxnSpPr>
+          <p:cNvPr id="25" name="Connector: Elbow 24">
+            <a:extLst>
+              <a:ext uri="{FF2B5EF4-FFF2-40B4-BE49-F238E27FC236}">
+                <a16:creationId xmlns:a16="http://schemas.microsoft.com/office/drawing/2014/main" id="{EC566A0E-4C57-4CF8-9BCF-2D3AA3AD8002}"/>
+              </a:ext>
+            </a:extLst>
+          </p:cNvPr>
+          <p:cNvCxnSpPr>
+            <a:endCxn id="10" idx="0"/>
+          </p:cNvCxnSpPr>
+          <p:nvPr/>
+        </p:nvCxnSpPr>
+        <p:spPr>
+          <a:xfrm rot="16200000" flipH="1">
+            <a:off x="7661069" y="2204357"/>
+            <a:ext cx="718458" cy="121722"/>
+          </a:xfrm>
+          <a:prstGeom prst="bentConnector3">
+            <a:avLst/>
+          </a:prstGeom>
+          <a:ln>
+            <a:tailEnd type="triangle"/>
+          </a:ln>
+        </p:spPr>
+        <p:style>
+          <a:lnRef idx="1">
+            <a:schemeClr val="accent2"/>
+          </a:lnRef>
+          <a:fillRef idx="0">
+            <a:schemeClr val="accent2"/>
+          </a:fillRef>
+          <a:effectRef idx="0">
+            <a:schemeClr val="accent2"/>
+          </a:effectRef>
+          <a:fontRef idx="minor">
+            <a:schemeClr val="tx1"/>
+          </a:fontRef>
+        </p:style>
+      </p:cxnSp>
+      <p:cxnSp>
+        <p:nvCxnSpPr>
+          <p:cNvPr id="27" name="Connector: Elbow 26">
+            <a:extLst>
+              <a:ext uri="{FF2B5EF4-FFF2-40B4-BE49-F238E27FC236}">
+                <a16:creationId xmlns:a16="http://schemas.microsoft.com/office/drawing/2014/main" id="{ADA9CDAE-2D8C-4B8D-A76E-FAFA2172D503}"/>
+              </a:ext>
+            </a:extLst>
+          </p:cNvPr>
+          <p:cNvCxnSpPr>
+            <a:endCxn id="11" idx="0"/>
+          </p:cNvCxnSpPr>
+          <p:nvPr/>
+        </p:nvCxnSpPr>
+        <p:spPr>
+          <a:xfrm rot="16200000" flipH="1">
+            <a:off x="9345880" y="2012867"/>
+            <a:ext cx="718458" cy="504702"/>
+          </a:xfrm>
+          <a:prstGeom prst="bentConnector3">
+            <a:avLst/>
+          </a:prstGeom>
+          <a:ln>
+            <a:tailEnd type="triangle"/>
+          </a:ln>
+        </p:spPr>
+        <p:style>
+          <a:lnRef idx="1">
+            <a:schemeClr val="dk1"/>
+          </a:lnRef>
+          <a:fillRef idx="0">
+            <a:schemeClr val="dk1"/>
+          </a:fillRef>
+          <a:effectRef idx="0">
+            <a:schemeClr val="dk1"/>
+          </a:effectRef>
+          <a:fontRef idx="minor">
+            <a:schemeClr val="tx1"/>
+          </a:fontRef>
+        </p:style>
+      </p:cxnSp>
+      <p:sp>
+        <p:nvSpPr>
+          <p:cNvPr id="28" name="TextBox 27">
+            <a:extLst>
+              <a:ext uri="{FF2B5EF4-FFF2-40B4-BE49-F238E27FC236}">
+                <a16:creationId xmlns:a16="http://schemas.microsoft.com/office/drawing/2014/main" id="{1C321F2B-AEEC-4697-90D2-B2FC3A15A308}"/>
+              </a:ext>
+            </a:extLst>
+          </p:cNvPr>
+          <p:cNvSpPr txBox="1"/>
+          <p:nvPr/>
+        </p:nvSpPr>
+        <p:spPr>
+          <a:xfrm>
+            <a:off x="4100945" y="1239852"/>
+            <a:ext cx="1335093" cy="830997"/>
+          </a:xfrm>
+          <a:prstGeom prst="rect">
+            <a:avLst/>
+          </a:prstGeom>
+          <a:noFill/>
+        </p:spPr>
+        <p:txBody>
+          <a:bodyPr wrap="square" rtlCol="0">
+            <a:spAutoFit/>
+          </a:bodyPr>
+          <a:lstStyle/>
+          <a:p>
+            <a:r>
+              <a:rPr lang="en-US" sz="1600" dirty="0"/>
+              <a:t>Tells go we’re declaring a function</a:t>
+            </a:r>
+          </a:p>
+        </p:txBody>
+      </p:sp>
+      <p:sp>
+        <p:nvSpPr>
+          <p:cNvPr id="29" name="TextBox 28">
+            <a:extLst>
+              <a:ext uri="{FF2B5EF4-FFF2-40B4-BE49-F238E27FC236}">
+                <a16:creationId xmlns:a16="http://schemas.microsoft.com/office/drawing/2014/main" id="{099D898D-6AF9-476C-A57C-97E1FC82A5C0}"/>
+              </a:ext>
+            </a:extLst>
+          </p:cNvPr>
+          <p:cNvSpPr txBox="1"/>
+          <p:nvPr/>
+        </p:nvSpPr>
+        <p:spPr>
+          <a:xfrm>
+            <a:off x="5742815" y="1239852"/>
+            <a:ext cx="1275502" cy="584775"/>
+          </a:xfrm>
+          <a:prstGeom prst="rect">
+            <a:avLst/>
+          </a:prstGeom>
+          <a:noFill/>
+        </p:spPr>
+        <p:txBody>
+          <a:bodyPr wrap="square" rtlCol="0">
+            <a:spAutoFit/>
+          </a:bodyPr>
+          <a:lstStyle/>
+          <a:p>
+            <a:r>
+              <a:rPr lang="en-US" sz="1600" dirty="0"/>
+              <a:t>Function name</a:t>
+            </a:r>
+          </a:p>
+        </p:txBody>
+      </p:sp>
+      <p:sp>
+        <p:nvSpPr>
+          <p:cNvPr id="30" name="TextBox 29">
+            <a:extLst>
+              <a:ext uri="{FF2B5EF4-FFF2-40B4-BE49-F238E27FC236}">
+                <a16:creationId xmlns:a16="http://schemas.microsoft.com/office/drawing/2014/main" id="{F1C1EC82-7817-4398-8E56-0D6A6A14900D}"/>
+              </a:ext>
+            </a:extLst>
+          </p:cNvPr>
+          <p:cNvSpPr txBox="1"/>
+          <p:nvPr/>
+        </p:nvSpPr>
+        <p:spPr>
+          <a:xfrm>
+            <a:off x="7628413" y="1238086"/>
+            <a:ext cx="1094014" cy="584775"/>
+          </a:xfrm>
+          <a:prstGeom prst="rect">
+            <a:avLst/>
+          </a:prstGeom>
+          <a:noFill/>
+        </p:spPr>
+        <p:txBody>
+          <a:bodyPr wrap="square" rtlCol="0">
+            <a:spAutoFit/>
+          </a:bodyPr>
+          <a:lstStyle/>
+          <a:p>
+            <a:r>
+              <a:rPr lang="en-US" sz="1600" dirty="0"/>
+              <a:t>Parameter list</a:t>
+            </a:r>
+          </a:p>
+        </p:txBody>
+      </p:sp>
+      <p:sp>
+        <p:nvSpPr>
+          <p:cNvPr id="31" name="TextBox 30">
+            <a:extLst>
+              <a:ext uri="{FF2B5EF4-FFF2-40B4-BE49-F238E27FC236}">
+                <a16:creationId xmlns:a16="http://schemas.microsoft.com/office/drawing/2014/main" id="{FA9BFCE0-BD9B-4E2B-A44E-F17872DBC5B6}"/>
+              </a:ext>
+            </a:extLst>
+          </p:cNvPr>
+          <p:cNvSpPr txBox="1"/>
+          <p:nvPr/>
+        </p:nvSpPr>
+        <p:spPr>
+          <a:xfrm>
+            <a:off x="9120250" y="1237917"/>
+            <a:ext cx="837210" cy="584775"/>
+          </a:xfrm>
+          <a:prstGeom prst="rect">
+            <a:avLst/>
+          </a:prstGeom>
+          <a:noFill/>
+        </p:spPr>
+        <p:txBody>
+          <a:bodyPr wrap="square" rtlCol="0">
+            <a:spAutoFit/>
+          </a:bodyPr>
+          <a:lstStyle/>
+          <a:p>
+            <a:r>
+              <a:rPr lang="en-US" sz="1600" dirty="0"/>
+              <a:t>Return type</a:t>
+            </a:r>
+          </a:p>
+        </p:txBody>
+      </p:sp>
+      <p:sp>
+        <p:nvSpPr>
+          <p:cNvPr id="32" name="TextBox 31">
+            <a:extLst>
+              <a:ext uri="{FF2B5EF4-FFF2-40B4-BE49-F238E27FC236}">
+                <a16:creationId xmlns:a16="http://schemas.microsoft.com/office/drawing/2014/main" id="{C4C26251-D223-4313-8A79-DF99EB58E43F}"/>
+              </a:ext>
+            </a:extLst>
+          </p:cNvPr>
+          <p:cNvSpPr txBox="1"/>
+          <p:nvPr/>
+        </p:nvSpPr>
+        <p:spPr>
+          <a:xfrm>
+            <a:off x="6151915" y="4346369"/>
+            <a:ext cx="1863432" cy="1323439"/>
+          </a:xfrm>
+          <a:prstGeom prst="rect">
+            <a:avLst/>
+          </a:prstGeom>
+          <a:noFill/>
+        </p:spPr>
+        <p:txBody>
+          <a:bodyPr wrap="square" rtlCol="0">
+            <a:spAutoFit/>
+          </a:bodyPr>
+          <a:lstStyle/>
+          <a:p>
+            <a:r>
+              <a:rPr lang="en-US" sz="1600" dirty="0"/>
+              <a:t>Function body, code to be run/executed when THIS function is called</a:t>
+            </a:r>
+          </a:p>
+        </p:txBody>
+      </p:sp>
+    </p:spTree>
+    <p:extLst>
+      <p:ext uri="{BB962C8B-B14F-4D97-AF65-F5344CB8AC3E}">
+        <p14:creationId xmlns:p14="http://schemas.microsoft.com/office/powerpoint/2010/main" val="4093965234"/>
       </p:ext>
     </p:extLst>
   </p:cSld>

</xml_diff>